<commit_message>
Added Gif to readme, changed delays of pack opening
</commit_message>
<xml_diff>
--- a/Presentation/HearthStone Card Database.pptx
+++ b/Presentation/HearthStone Card Database.pptx
@@ -4484,7 +4484,7 @@
           <a:p>
             <a:r>
               <a:rPr lang="en-US" dirty="0"/>
-              <a:t>Features *ADD SCREENSHOTS*</a:t>
+              <a:t>Features</a:t>
             </a:r>
           </a:p>
         </p:txBody>
@@ -4774,7 +4774,7 @@
         <p:spPr/>
         <p:txBody>
           <a:bodyPr>
-            <a:normAutofit lnSpcReduction="10000"/>
+            <a:normAutofit/>
           </a:bodyPr>
           <a:lstStyle/>
           <a:p>
@@ -4832,16 +4832,6 @@
             <a:r>
               <a:rPr lang="en-US" dirty="0"/>
               <a:t>Description (string - What the card does)</a:t>
-            </a:r>
-          </a:p>
-          <a:p>
-            <a:r>
-              <a:rPr lang="en-US" dirty="0" err="1"/>
-              <a:t>flavorText</a:t>
-            </a:r>
-            <a:r>
-              <a:rPr lang="en-US" dirty="0"/>
-              <a:t> (string - Story behind the card)</a:t>
             </a:r>
           </a:p>
           <a:p>

</xml_diff>